<commit_message>
chg: Changed error in III Corps file
</commit_message>
<xml_diff>
--- a/UNDER DEVELOPMENT/OPAR LCC III CORPS CONCEPT OF OPERATIONS PHASE 1.pptx
+++ b/UNDER DEVELOPMENT/OPAR LCC III CORPS CONCEPT OF OPERATIONS PHASE 1.pptx
@@ -367,7 +367,7 @@
     </p:spTree>
     <p:extLst>
       <p:ext uri="{BB962C8B-B14F-4D97-AF65-F5344CB8AC3E}">
-        <p14:creationId xmlns:p14="http://schemas.microsoft.com/office/powerpoint/2010/main" xmlns="" val="2256331300"/>
+        <p14:creationId xmlns="" xmlns:p14="http://schemas.microsoft.com/office/powerpoint/2010/main" val="2256331300"/>
       </p:ext>
     </p:extLst>
   </p:cSld>
@@ -629,7 +629,7 @@
     </p:spTree>
     <p:extLst>
       <p:ext uri="{BB962C8B-B14F-4D97-AF65-F5344CB8AC3E}">
-        <p14:creationId xmlns:p14="http://schemas.microsoft.com/office/powerpoint/2010/main" xmlns="" val="3255761542"/>
+        <p14:creationId xmlns="" xmlns:p14="http://schemas.microsoft.com/office/powerpoint/2010/main" val="3255761542"/>
       </p:ext>
     </p:extLst>
   </p:cSld>
@@ -3996,14 +3996,7 @@
                 <a:latin typeface="Arial" pitchFamily="34" charset="0"/>
                 <a:cs typeface="Arial" pitchFamily="34" charset="0"/>
               </a:rPr>
-              <a:t>Published: </a:t>
-            </a:r>
-            <a:r>
-              <a:rPr lang="en-US" sz="1400" dirty="0" smtClean="0">
-                <a:latin typeface="Arial" pitchFamily="34" charset="0"/>
-                <a:cs typeface="Arial" pitchFamily="34" charset="0"/>
-              </a:rPr>
-              <a:t>2020-09-07</a:t>
+              <a:t>Published: 2020-09-07</a:t>
             </a:r>
             <a:endParaRPr lang="en-US" sz="1400" dirty="0">
               <a:latin typeface="Arial" pitchFamily="34" charset="0"/>
@@ -4222,7 +4215,7 @@
           <a:blip r:embed="rId2" cstate="print">
             <a:extLst>
               <a:ext uri="{28A0092B-C50C-407E-A947-70E740481C1C}">
-                <a14:useLocalDpi xmlns:a14="http://schemas.microsoft.com/office/drawing/2010/main" xmlns="" val="0"/>
+                <a14:useLocalDpi xmlns="" xmlns:a14="http://schemas.microsoft.com/office/drawing/2010/main" val="0"/>
               </a:ext>
             </a:extLst>
           </a:blip>
@@ -4245,14 +4238,14 @@
           </a:ln>
           <a:extLst>
             <a:ext uri="{909E8E84-426E-40DD-AFC4-6F175D3DCCD1}">
-              <a14:hiddenFill xmlns:a14="http://schemas.microsoft.com/office/drawing/2010/main" xmlns="">
+              <a14:hiddenFill xmlns="" xmlns:a14="http://schemas.microsoft.com/office/drawing/2010/main">
                 <a:solidFill>
                   <a:schemeClr val="accent1"/>
                 </a:solidFill>
               </a14:hiddenFill>
             </a:ext>
             <a:ext uri="{91240B29-F687-4F45-9708-019B960494DF}">
-              <a14:hiddenLine xmlns:a14="http://schemas.microsoft.com/office/drawing/2010/main" xmlns="" w="9525">
+              <a14:hiddenLine xmlns="" xmlns:a14="http://schemas.microsoft.com/office/drawing/2010/main" w="9525">
                 <a:solidFill>
                   <a:schemeClr val="tx1"/>
                 </a:solidFill>
@@ -4439,7 +4432,7 @@
           <a:blip r:embed="rId3" cstate="print">
             <a:extLst>
               <a:ext uri="{28A0092B-C50C-407E-A947-70E740481C1C}">
-                <a14:useLocalDpi xmlns:a14="http://schemas.microsoft.com/office/drawing/2010/main" xmlns="" val="0"/>
+                <a14:useLocalDpi xmlns="" xmlns:a14="http://schemas.microsoft.com/office/drawing/2010/main" val="0"/>
               </a:ext>
             </a:extLst>
           </a:blip>
@@ -4463,14 +4456,14 @@
           <a:effectLst/>
           <a:extLst>
             <a:ext uri="{909E8E84-426E-40DD-AFC4-6F175D3DCCD1}">
-              <a14:hiddenFill xmlns:a14="http://schemas.microsoft.com/office/drawing/2010/main" xmlns="">
+              <a14:hiddenFill xmlns="" xmlns:a14="http://schemas.microsoft.com/office/drawing/2010/main">
                 <a:solidFill>
                   <a:schemeClr val="accent1"/>
                 </a:solidFill>
               </a14:hiddenFill>
             </a:ext>
             <a:ext uri="{91240B29-F687-4F45-9708-019B960494DF}">
-              <a14:hiddenLine xmlns:a14="http://schemas.microsoft.com/office/drawing/2010/main" xmlns="" w="9525">
+              <a14:hiddenLine xmlns="" xmlns:a14="http://schemas.microsoft.com/office/drawing/2010/main" w="9525">
                 <a:solidFill>
                   <a:schemeClr val="tx1"/>
                 </a:solidFill>
@@ -4480,7 +4473,7 @@
               </a14:hiddenLine>
             </a:ext>
             <a:ext uri="{AF507438-7753-43E0-B8FC-AC1667EBCBE1}">
-              <a14:hiddenEffects xmlns:a14="http://schemas.microsoft.com/office/drawing/2010/main" xmlns="">
+              <a14:hiddenEffects xmlns="" xmlns:a14="http://schemas.microsoft.com/office/drawing/2010/main">
                 <a:effectLst>
                   <a:outerShdw dist="35921" dir="2700000" algn="ctr" rotWithShape="0">
                     <a:schemeClr val="bg2"/>
@@ -4582,13 +4575,8 @@
             </a:pPr>
             <a:r>
               <a:rPr lang="en-US" sz="1200" b="1" dirty="0" smtClean="0"/>
-              <a:t>Stage 1: ( </a:t>
-            </a:r>
-            <a:r>
-              <a:rPr lang="en-US" sz="1200" b="1" dirty="0" smtClean="0"/>
-              <a:t>D+0)</a:t>
-            </a:r>
-            <a:endParaRPr lang="en-US" sz="1200" b="1" dirty="0" smtClean="0"/>
+              <a:t>Stage 1: ( D+0)</a:t>
+            </a:r>
           </a:p>
           <a:p>
             <a:pPr marL="800100" lvl="1" indent="-342900">
@@ -4607,23 +4595,7 @@
             </a:pPr>
             <a:r>
               <a:rPr lang="en-US" sz="1200" b="1" dirty="0" smtClean="0"/>
-              <a:t>Stage 2: ( </a:t>
-            </a:r>
-            <a:r>
-              <a:rPr lang="en-US" sz="1200" b="1" dirty="0" smtClean="0"/>
-              <a:t>D+1 </a:t>
-            </a:r>
-            <a:r>
-              <a:rPr lang="en-US" sz="1200" b="1" dirty="0" smtClean="0"/>
-              <a:t>to </a:t>
-            </a:r>
-            <a:r>
-              <a:rPr lang="en-US" sz="1200" b="1" dirty="0" smtClean="0"/>
-              <a:t>D+3 </a:t>
-            </a:r>
-            <a:r>
-              <a:rPr lang="en-US" sz="1200" b="1" dirty="0" smtClean="0"/>
-              <a:t>)</a:t>
+              <a:t>Stage 2: ( D+1 to D+3 )</a:t>
             </a:r>
           </a:p>
           <a:p>
@@ -4643,21 +4615,8 @@
             </a:pPr>
             <a:r>
               <a:rPr lang="en-US" sz="1200" b="1" dirty="0" smtClean="0"/>
-              <a:t>Stage 3: (</a:t>
-            </a:r>
-            <a:r>
-              <a:rPr lang="en-US" sz="1200" b="1" dirty="0" smtClean="0"/>
-              <a:t>D+4 </a:t>
-            </a:r>
-            <a:r>
-              <a:rPr lang="en-US" sz="1200" b="1" dirty="0" smtClean="0"/>
-              <a:t>to </a:t>
-            </a:r>
-            <a:r>
-              <a:rPr lang="en-US" sz="1200" b="1" dirty="0" smtClean="0"/>
-              <a:t>D+5)</a:t>
-            </a:r>
-            <a:endParaRPr lang="en-US" sz="1200" b="1" dirty="0" smtClean="0"/>
+              <a:t>Stage 3: (D+4 to D+5)</a:t>
+            </a:r>
           </a:p>
           <a:p>
             <a:pPr marL="800100" lvl="1" indent="-342900">
@@ -4715,8 +4674,16 @@
               <a:t>Main effort: </a:t>
             </a:r>
             <a:r>
+              <a:rPr lang="en-US" sz="1200" smtClean="0"/>
+              <a:t>starting </a:t>
+            </a:r>
+            <a:r>
+              <a:rPr lang="en-US" sz="1200" smtClean="0"/>
+              <a:t>D+5 </a:t>
+            </a:r>
+            <a:r>
               <a:rPr lang="en-US" sz="1200" dirty="0" smtClean="0"/>
-              <a:t>starting D+8 by 91</a:t>
+              <a:t>by 91</a:t>
             </a:r>
             <a:r>
               <a:rPr lang="en-US" sz="1200" baseline="30000" dirty="0" smtClean="0"/>
@@ -4812,7 +4779,6 @@
               <a:rPr lang="en-US" sz="1200" b="1" dirty="0" smtClean="0"/>
               <a:t>D+7)</a:t>
             </a:r>
-            <a:endParaRPr lang="en-US" sz="1200" b="1" dirty="0" smtClean="0"/>
           </a:p>
           <a:p>
             <a:pPr marL="800100" lvl="1" indent="-342900">
@@ -4915,7 +4881,6 @@
               <a:rPr lang="en-US" sz="1200" b="1" dirty="0" smtClean="0"/>
               <a:t>D+10)</a:t>
             </a:r>
-            <a:endParaRPr lang="en-US" sz="1200" b="1" dirty="0" smtClean="0"/>
           </a:p>
           <a:p>
             <a:pPr marL="800100" lvl="1" indent="-342900">

</xml_diff>